<commit_message>
Added chess board pattern
</commit_message>
<xml_diff>
--- a/doc/chessboardpattern.pptx
+++ b/doc/chessboardpattern.pptx
@@ -5,7 +5,7 @@
     <p:sldMasterId id="2147483660" r:id="rId1"/>
   </p:sldMasterIdLst>
   <p:sldIdLst>
-    <p:sldId id="258" r:id="rId2"/>
+    <p:sldId id="259" r:id="rId2"/>
   </p:sldIdLst>
   <p:sldSz cx="9144000" cy="6858000" type="screen4x3"/>
   <p:notesSz cx="6858000" cy="9144000"/>
@@ -104,6 +104,11 @@
       </a:defRPr>
     </a:lvl9pPr>
   </p:defaultTextStyle>
+  <p:extLst>
+    <p:ext uri="{EFAFB233-063F-42B5-8137-9DF3F51BA10A}">
+      <p15:sldGuideLst xmlns:p15="http://schemas.microsoft.com/office/powerpoint/2012/main"/>
+    </p:ext>
+  </p:extLst>
 </p:presentation>
 </file>
 
@@ -238,7 +243,7 @@
           <a:p>
             <a:fld id="{F131203E-82D9-4945-A395-5E3257D6893A}" type="datetimeFigureOut">
               <a:rPr kumimoji="1" lang="ja-JP" altLang="en-US" smtClean="0"/>
-              <a:t>2018/4/1</a:t>
+              <a:t>2018/4/4</a:t>
             </a:fld>
             <a:endParaRPr kumimoji="1" lang="ja-JP" altLang="en-US" dirty="0"/>
           </a:p>
@@ -440,7 +445,7 @@
           <a:p>
             <a:fld id="{F131203E-82D9-4945-A395-5E3257D6893A}" type="datetimeFigureOut">
               <a:rPr kumimoji="1" lang="ja-JP" altLang="en-US" smtClean="0"/>
-              <a:t>2018/4/1</a:t>
+              <a:t>2018/4/4</a:t>
             </a:fld>
             <a:endParaRPr kumimoji="1" lang="ja-JP" altLang="en-US" dirty="0"/>
           </a:p>
@@ -652,7 +657,7 @@
           <a:p>
             <a:fld id="{F131203E-82D9-4945-A395-5E3257D6893A}" type="datetimeFigureOut">
               <a:rPr kumimoji="1" lang="ja-JP" altLang="en-US" smtClean="0"/>
-              <a:t>2018/4/1</a:t>
+              <a:t>2018/4/4</a:t>
             </a:fld>
             <a:endParaRPr kumimoji="1" lang="ja-JP" altLang="en-US" dirty="0"/>
           </a:p>
@@ -854,7 +859,7 @@
           <a:p>
             <a:fld id="{F131203E-82D9-4945-A395-5E3257D6893A}" type="datetimeFigureOut">
               <a:rPr kumimoji="1" lang="ja-JP" altLang="en-US" smtClean="0"/>
-              <a:t>2018/4/1</a:t>
+              <a:t>2018/4/4</a:t>
             </a:fld>
             <a:endParaRPr kumimoji="1" lang="ja-JP" altLang="en-US" dirty="0"/>
           </a:p>
@@ -1098,7 +1103,7 @@
           <a:p>
             <a:fld id="{F131203E-82D9-4945-A395-5E3257D6893A}" type="datetimeFigureOut">
               <a:rPr kumimoji="1" lang="ja-JP" altLang="en-US" smtClean="0"/>
-              <a:t>2018/4/1</a:t>
+              <a:t>2018/4/4</a:t>
             </a:fld>
             <a:endParaRPr kumimoji="1" lang="ja-JP" altLang="en-US" dirty="0"/>
           </a:p>
@@ -1394,7 +1399,7 @@
           <a:p>
             <a:fld id="{F131203E-82D9-4945-A395-5E3257D6893A}" type="datetimeFigureOut">
               <a:rPr kumimoji="1" lang="ja-JP" altLang="en-US" smtClean="0"/>
-              <a:t>2018/4/1</a:t>
+              <a:t>2018/4/4</a:t>
             </a:fld>
             <a:endParaRPr kumimoji="1" lang="ja-JP" altLang="en-US" dirty="0"/>
           </a:p>
@@ -1825,7 +1830,7 @@
           <a:p>
             <a:fld id="{F131203E-82D9-4945-A395-5E3257D6893A}" type="datetimeFigureOut">
               <a:rPr kumimoji="1" lang="ja-JP" altLang="en-US" smtClean="0"/>
-              <a:t>2018/4/1</a:t>
+              <a:t>2018/4/4</a:t>
             </a:fld>
             <a:endParaRPr kumimoji="1" lang="ja-JP" altLang="en-US" dirty="0"/>
           </a:p>
@@ -1943,7 +1948,7 @@
           <a:p>
             <a:fld id="{F131203E-82D9-4945-A395-5E3257D6893A}" type="datetimeFigureOut">
               <a:rPr kumimoji="1" lang="ja-JP" altLang="en-US" smtClean="0"/>
-              <a:t>2018/4/1</a:t>
+              <a:t>2018/4/4</a:t>
             </a:fld>
             <a:endParaRPr kumimoji="1" lang="ja-JP" altLang="en-US" dirty="0"/>
           </a:p>
@@ -2038,7 +2043,7 @@
           <a:p>
             <a:fld id="{F131203E-82D9-4945-A395-5E3257D6893A}" type="datetimeFigureOut">
               <a:rPr kumimoji="1" lang="ja-JP" altLang="en-US" smtClean="0"/>
-              <a:t>2018/4/1</a:t>
+              <a:t>2018/4/4</a:t>
             </a:fld>
             <a:endParaRPr kumimoji="1" lang="ja-JP" altLang="en-US" dirty="0"/>
           </a:p>
@@ -2347,7 +2352,7 @@
           <a:p>
             <a:fld id="{F131203E-82D9-4945-A395-5E3257D6893A}" type="datetimeFigureOut">
               <a:rPr kumimoji="1" lang="ja-JP" altLang="en-US" smtClean="0"/>
-              <a:t>2018/4/1</a:t>
+              <a:t>2018/4/4</a:t>
             </a:fld>
             <a:endParaRPr kumimoji="1" lang="ja-JP" altLang="en-US" dirty="0"/>
           </a:p>
@@ -2604,7 +2609,7 @@
           <a:p>
             <a:fld id="{F131203E-82D9-4945-A395-5E3257D6893A}" type="datetimeFigureOut">
               <a:rPr kumimoji="1" lang="ja-JP" altLang="en-US" smtClean="0"/>
-              <a:t>2018/4/1</a:t>
+              <a:t>2018/4/4</a:t>
             </a:fld>
             <a:endParaRPr kumimoji="1" lang="ja-JP" altLang="en-US" dirty="0"/>
           </a:p>
@@ -2849,7 +2854,7 @@
           <a:p>
             <a:fld id="{F131203E-82D9-4945-A395-5E3257D6893A}" type="datetimeFigureOut">
               <a:rPr kumimoji="1" lang="ja-JP" altLang="en-US" smtClean="0"/>
-              <a:t>2018/4/1</a:t>
+              <a:t>2018/4/4</a:t>
             </a:fld>
             <a:endParaRPr kumimoji="1" lang="ja-JP" altLang="en-US" dirty="0"/>
           </a:p>
@@ -3254,2048 +3259,33 @@
           <a:chExt cx="0" cy="0"/>
         </a:xfrm>
       </p:grpSpPr>
-      <p:grpSp>
-        <p:nvGrpSpPr>
-          <p:cNvPr id="76" name="グループ化 75"/>
-          <p:cNvGrpSpPr/>
+      <p:pic>
+        <p:nvPicPr>
+          <p:cNvPr id="4" name="図 3"/>
+          <p:cNvPicPr>
+            <a:picLocks noChangeAspect="1"/>
+          </p:cNvPicPr>
           <p:nvPr/>
-        </p:nvGrpSpPr>
-        <p:grpSpPr>
+        </p:nvPicPr>
+        <p:blipFill>
+          <a:blip r:embed="rId2"/>
+          <a:stretch>
+            <a:fillRect/>
+          </a:stretch>
+        </p:blipFill>
+        <p:spPr>
           <a:xfrm>
-            <a:off x="905821" y="772265"/>
-            <a:ext cx="7332359" cy="5313471"/>
-            <a:chOff x="832981" y="350729"/>
-            <a:chExt cx="11987404" cy="8686799"/>
+            <a:off x="904938" y="761769"/>
+            <a:ext cx="7334124" cy="5334462"/>
           </a:xfrm>
-        </p:grpSpPr>
-        <p:sp>
-          <p:nvSpPr>
-            <p:cNvPr id="4" name="正方形/長方形 3"/>
-            <p:cNvSpPr/>
-            <p:nvPr/>
-          </p:nvSpPr>
-          <p:spPr>
-            <a:xfrm>
-              <a:off x="832981" y="350729"/>
-              <a:ext cx="1089764" cy="1089764"/>
-            </a:xfrm>
-            <a:prstGeom prst="rect">
-              <a:avLst/>
-            </a:prstGeom>
-            <a:solidFill>
-              <a:schemeClr val="tx1"/>
-            </a:solidFill>
-            <a:ln>
-              <a:noFill/>
-            </a:ln>
-          </p:spPr>
-          <p:style>
-            <a:lnRef idx="2">
-              <a:schemeClr val="accent1">
-                <a:shade val="50000"/>
-              </a:schemeClr>
-            </a:lnRef>
-            <a:fillRef idx="1">
-              <a:schemeClr val="accent1"/>
-            </a:fillRef>
-            <a:effectRef idx="0">
-              <a:schemeClr val="accent1"/>
-            </a:effectRef>
-            <a:fontRef idx="minor">
-              <a:schemeClr val="lt1"/>
-            </a:fontRef>
-          </p:style>
-          <p:txBody>
-            <a:bodyPr rtlCol="0" anchor="ctr"/>
-            <a:lstStyle/>
-            <a:p>
-              <a:pPr algn="ctr"/>
-              <a:endParaRPr kumimoji="1" lang="ja-JP" altLang="en-US" dirty="0"/>
-            </a:p>
-          </p:txBody>
-        </p:sp>
-        <p:sp>
-          <p:nvSpPr>
-            <p:cNvPr id="5" name="正方形/長方形 4"/>
-            <p:cNvSpPr/>
-            <p:nvPr/>
-          </p:nvSpPr>
-          <p:spPr>
-            <a:xfrm>
-              <a:off x="1922745" y="1440493"/>
-              <a:ext cx="1089764" cy="1089764"/>
-            </a:xfrm>
-            <a:prstGeom prst="rect">
-              <a:avLst/>
-            </a:prstGeom>
-            <a:solidFill>
-              <a:schemeClr val="tx1"/>
-            </a:solidFill>
-            <a:ln>
-              <a:noFill/>
-            </a:ln>
-          </p:spPr>
-          <p:style>
-            <a:lnRef idx="2">
-              <a:schemeClr val="accent1">
-                <a:shade val="50000"/>
-              </a:schemeClr>
-            </a:lnRef>
-            <a:fillRef idx="1">
-              <a:schemeClr val="accent1"/>
-            </a:fillRef>
-            <a:effectRef idx="0">
-              <a:schemeClr val="accent1"/>
-            </a:effectRef>
-            <a:fontRef idx="minor">
-              <a:schemeClr val="lt1"/>
-            </a:fontRef>
-          </p:style>
-          <p:txBody>
-            <a:bodyPr rtlCol="0" anchor="ctr"/>
-            <a:lstStyle/>
-            <a:p>
-              <a:pPr algn="ctr"/>
-              <a:endParaRPr kumimoji="1" lang="ja-JP" altLang="en-US" dirty="0"/>
-            </a:p>
-          </p:txBody>
-        </p:sp>
-        <p:sp>
-          <p:nvSpPr>
-            <p:cNvPr id="6" name="正方形/長方形 5"/>
-            <p:cNvSpPr/>
-            <p:nvPr/>
-          </p:nvSpPr>
-          <p:spPr>
-            <a:xfrm>
-              <a:off x="832981" y="2530257"/>
-              <a:ext cx="1089764" cy="1089764"/>
-            </a:xfrm>
-            <a:prstGeom prst="rect">
-              <a:avLst/>
-            </a:prstGeom>
-            <a:solidFill>
-              <a:schemeClr val="tx1"/>
-            </a:solidFill>
-            <a:ln>
-              <a:noFill/>
-            </a:ln>
-          </p:spPr>
-          <p:style>
-            <a:lnRef idx="2">
-              <a:schemeClr val="accent1">
-                <a:shade val="50000"/>
-              </a:schemeClr>
-            </a:lnRef>
-            <a:fillRef idx="1">
-              <a:schemeClr val="accent1"/>
-            </a:fillRef>
-            <a:effectRef idx="0">
-              <a:schemeClr val="accent1"/>
-            </a:effectRef>
-            <a:fontRef idx="minor">
-              <a:schemeClr val="lt1"/>
-            </a:fontRef>
-          </p:style>
-          <p:txBody>
-            <a:bodyPr rtlCol="0" anchor="ctr"/>
-            <a:lstStyle/>
-            <a:p>
-              <a:pPr algn="ctr"/>
-              <a:endParaRPr kumimoji="1" lang="ja-JP" altLang="en-US" dirty="0"/>
-            </a:p>
-          </p:txBody>
-        </p:sp>
-        <p:sp>
-          <p:nvSpPr>
-            <p:cNvPr id="7" name="正方形/長方形 6"/>
-            <p:cNvSpPr/>
-            <p:nvPr/>
-          </p:nvSpPr>
-          <p:spPr>
-            <a:xfrm>
-              <a:off x="1922745" y="3620021"/>
-              <a:ext cx="1089764" cy="1089764"/>
-            </a:xfrm>
-            <a:prstGeom prst="rect">
-              <a:avLst/>
-            </a:prstGeom>
-            <a:solidFill>
-              <a:schemeClr val="tx1"/>
-            </a:solidFill>
-            <a:ln>
-              <a:noFill/>
-            </a:ln>
-          </p:spPr>
-          <p:style>
-            <a:lnRef idx="2">
-              <a:schemeClr val="accent1">
-                <a:shade val="50000"/>
-              </a:schemeClr>
-            </a:lnRef>
-            <a:fillRef idx="1">
-              <a:schemeClr val="accent1"/>
-            </a:fillRef>
-            <a:effectRef idx="0">
-              <a:schemeClr val="accent1"/>
-            </a:effectRef>
-            <a:fontRef idx="minor">
-              <a:schemeClr val="lt1"/>
-            </a:fontRef>
-          </p:style>
-          <p:txBody>
-            <a:bodyPr rtlCol="0" anchor="ctr"/>
-            <a:lstStyle/>
-            <a:p>
-              <a:pPr algn="ctr"/>
-              <a:endParaRPr kumimoji="1" lang="ja-JP" altLang="en-US" dirty="0"/>
-            </a:p>
-          </p:txBody>
-        </p:sp>
-        <p:sp>
-          <p:nvSpPr>
-            <p:cNvPr id="8" name="正方形/長方形 7"/>
-            <p:cNvSpPr/>
-            <p:nvPr/>
-          </p:nvSpPr>
-          <p:spPr>
-            <a:xfrm>
-              <a:off x="3012509" y="350729"/>
-              <a:ext cx="1089764" cy="1089764"/>
-            </a:xfrm>
-            <a:prstGeom prst="rect">
-              <a:avLst/>
-            </a:prstGeom>
-            <a:solidFill>
-              <a:schemeClr val="tx1"/>
-            </a:solidFill>
-            <a:ln>
-              <a:noFill/>
-            </a:ln>
-          </p:spPr>
-          <p:style>
-            <a:lnRef idx="2">
-              <a:schemeClr val="accent1">
-                <a:shade val="50000"/>
-              </a:schemeClr>
-            </a:lnRef>
-            <a:fillRef idx="1">
-              <a:schemeClr val="accent1"/>
-            </a:fillRef>
-            <a:effectRef idx="0">
-              <a:schemeClr val="accent1"/>
-            </a:effectRef>
-            <a:fontRef idx="minor">
-              <a:schemeClr val="lt1"/>
-            </a:fontRef>
-          </p:style>
-          <p:txBody>
-            <a:bodyPr rtlCol="0" anchor="ctr"/>
-            <a:lstStyle/>
-            <a:p>
-              <a:pPr algn="ctr"/>
-              <a:endParaRPr kumimoji="1" lang="ja-JP" altLang="en-US" dirty="0"/>
-            </a:p>
-          </p:txBody>
-        </p:sp>
-        <p:sp>
-          <p:nvSpPr>
-            <p:cNvPr id="9" name="正方形/長方形 8"/>
-            <p:cNvSpPr/>
-            <p:nvPr/>
-          </p:nvSpPr>
-          <p:spPr>
-            <a:xfrm>
-              <a:off x="4102273" y="1440493"/>
-              <a:ext cx="1089764" cy="1089764"/>
-            </a:xfrm>
-            <a:prstGeom prst="rect">
-              <a:avLst/>
-            </a:prstGeom>
-            <a:solidFill>
-              <a:schemeClr val="tx1"/>
-            </a:solidFill>
-            <a:ln>
-              <a:noFill/>
-            </a:ln>
-          </p:spPr>
-          <p:style>
-            <a:lnRef idx="2">
-              <a:schemeClr val="accent1">
-                <a:shade val="50000"/>
-              </a:schemeClr>
-            </a:lnRef>
-            <a:fillRef idx="1">
-              <a:schemeClr val="accent1"/>
-            </a:fillRef>
-            <a:effectRef idx="0">
-              <a:schemeClr val="accent1"/>
-            </a:effectRef>
-            <a:fontRef idx="minor">
-              <a:schemeClr val="lt1"/>
-            </a:fontRef>
-          </p:style>
-          <p:txBody>
-            <a:bodyPr rtlCol="0" anchor="ctr"/>
-            <a:lstStyle/>
-            <a:p>
-              <a:pPr algn="ctr"/>
-              <a:endParaRPr kumimoji="1" lang="ja-JP" altLang="en-US" dirty="0"/>
-            </a:p>
-          </p:txBody>
-        </p:sp>
-        <p:sp>
-          <p:nvSpPr>
-            <p:cNvPr id="10" name="正方形/長方形 9"/>
-            <p:cNvSpPr/>
-            <p:nvPr/>
-          </p:nvSpPr>
-          <p:spPr>
-            <a:xfrm>
-              <a:off x="3012509" y="2530257"/>
-              <a:ext cx="1089764" cy="1089764"/>
-            </a:xfrm>
-            <a:prstGeom prst="rect">
-              <a:avLst/>
-            </a:prstGeom>
-            <a:solidFill>
-              <a:schemeClr val="tx1"/>
-            </a:solidFill>
-            <a:ln>
-              <a:noFill/>
-            </a:ln>
-          </p:spPr>
-          <p:style>
-            <a:lnRef idx="2">
-              <a:schemeClr val="accent1">
-                <a:shade val="50000"/>
-              </a:schemeClr>
-            </a:lnRef>
-            <a:fillRef idx="1">
-              <a:schemeClr val="accent1"/>
-            </a:fillRef>
-            <a:effectRef idx="0">
-              <a:schemeClr val="accent1"/>
-            </a:effectRef>
-            <a:fontRef idx="minor">
-              <a:schemeClr val="lt1"/>
-            </a:fontRef>
-          </p:style>
-          <p:txBody>
-            <a:bodyPr rtlCol="0" anchor="ctr"/>
-            <a:lstStyle/>
-            <a:p>
-              <a:pPr algn="ctr"/>
-              <a:endParaRPr kumimoji="1" lang="ja-JP" altLang="en-US" dirty="0"/>
-            </a:p>
-          </p:txBody>
-        </p:sp>
-        <p:sp>
-          <p:nvSpPr>
-            <p:cNvPr id="11" name="正方形/長方形 10"/>
-            <p:cNvSpPr/>
-            <p:nvPr/>
-          </p:nvSpPr>
-          <p:spPr>
-            <a:xfrm>
-              <a:off x="4102273" y="3620021"/>
-              <a:ext cx="1089764" cy="1089764"/>
-            </a:xfrm>
-            <a:prstGeom prst="rect">
-              <a:avLst/>
-            </a:prstGeom>
-            <a:solidFill>
-              <a:schemeClr val="tx1"/>
-            </a:solidFill>
-            <a:ln>
-              <a:noFill/>
-            </a:ln>
-          </p:spPr>
-          <p:style>
-            <a:lnRef idx="2">
-              <a:schemeClr val="accent1">
-                <a:shade val="50000"/>
-              </a:schemeClr>
-            </a:lnRef>
-            <a:fillRef idx="1">
-              <a:schemeClr val="accent1"/>
-            </a:fillRef>
-            <a:effectRef idx="0">
-              <a:schemeClr val="accent1"/>
-            </a:effectRef>
-            <a:fontRef idx="minor">
-              <a:schemeClr val="lt1"/>
-            </a:fontRef>
-          </p:style>
-          <p:txBody>
-            <a:bodyPr rtlCol="0" anchor="ctr"/>
-            <a:lstStyle/>
-            <a:p>
-              <a:pPr algn="ctr"/>
-              <a:endParaRPr kumimoji="1" lang="ja-JP" altLang="en-US" dirty="0"/>
-            </a:p>
-          </p:txBody>
-        </p:sp>
-        <p:sp>
-          <p:nvSpPr>
-            <p:cNvPr id="12" name="正方形/長方形 11"/>
-            <p:cNvSpPr/>
-            <p:nvPr/>
-          </p:nvSpPr>
-          <p:spPr>
-            <a:xfrm>
-              <a:off x="5192037" y="350729"/>
-              <a:ext cx="1089764" cy="1089764"/>
-            </a:xfrm>
-            <a:prstGeom prst="rect">
-              <a:avLst/>
-            </a:prstGeom>
-            <a:solidFill>
-              <a:schemeClr val="tx1"/>
-            </a:solidFill>
-            <a:ln>
-              <a:noFill/>
-            </a:ln>
-          </p:spPr>
-          <p:style>
-            <a:lnRef idx="2">
-              <a:schemeClr val="accent1">
-                <a:shade val="50000"/>
-              </a:schemeClr>
-            </a:lnRef>
-            <a:fillRef idx="1">
-              <a:schemeClr val="accent1"/>
-            </a:fillRef>
-            <a:effectRef idx="0">
-              <a:schemeClr val="accent1"/>
-            </a:effectRef>
-            <a:fontRef idx="minor">
-              <a:schemeClr val="lt1"/>
-            </a:fontRef>
-          </p:style>
-          <p:txBody>
-            <a:bodyPr rtlCol="0" anchor="ctr"/>
-            <a:lstStyle/>
-            <a:p>
-              <a:pPr algn="ctr"/>
-              <a:endParaRPr kumimoji="1" lang="ja-JP" altLang="en-US" dirty="0"/>
-            </a:p>
-          </p:txBody>
-        </p:sp>
-        <p:sp>
-          <p:nvSpPr>
-            <p:cNvPr id="13" name="正方形/長方形 12"/>
-            <p:cNvSpPr/>
-            <p:nvPr/>
-          </p:nvSpPr>
-          <p:spPr>
-            <a:xfrm>
-              <a:off x="6281801" y="1440493"/>
-              <a:ext cx="1089764" cy="1089764"/>
-            </a:xfrm>
-            <a:prstGeom prst="rect">
-              <a:avLst/>
-            </a:prstGeom>
-            <a:solidFill>
-              <a:schemeClr val="tx1"/>
-            </a:solidFill>
-            <a:ln>
-              <a:noFill/>
-            </a:ln>
-          </p:spPr>
-          <p:style>
-            <a:lnRef idx="2">
-              <a:schemeClr val="accent1">
-                <a:shade val="50000"/>
-              </a:schemeClr>
-            </a:lnRef>
-            <a:fillRef idx="1">
-              <a:schemeClr val="accent1"/>
-            </a:fillRef>
-            <a:effectRef idx="0">
-              <a:schemeClr val="accent1"/>
-            </a:effectRef>
-            <a:fontRef idx="minor">
-              <a:schemeClr val="lt1"/>
-            </a:fontRef>
-          </p:style>
-          <p:txBody>
-            <a:bodyPr rtlCol="0" anchor="ctr"/>
-            <a:lstStyle/>
-            <a:p>
-              <a:pPr algn="ctr"/>
-              <a:endParaRPr kumimoji="1" lang="ja-JP" altLang="en-US" dirty="0"/>
-            </a:p>
-          </p:txBody>
-        </p:sp>
-        <p:sp>
-          <p:nvSpPr>
-            <p:cNvPr id="14" name="正方形/長方形 13"/>
-            <p:cNvSpPr/>
-            <p:nvPr/>
-          </p:nvSpPr>
-          <p:spPr>
-            <a:xfrm>
-              <a:off x="5192037" y="2530257"/>
-              <a:ext cx="1089764" cy="1089764"/>
-            </a:xfrm>
-            <a:prstGeom prst="rect">
-              <a:avLst/>
-            </a:prstGeom>
-            <a:solidFill>
-              <a:schemeClr val="tx1"/>
-            </a:solidFill>
-            <a:ln>
-              <a:noFill/>
-            </a:ln>
-          </p:spPr>
-          <p:style>
-            <a:lnRef idx="2">
-              <a:schemeClr val="accent1">
-                <a:shade val="50000"/>
-              </a:schemeClr>
-            </a:lnRef>
-            <a:fillRef idx="1">
-              <a:schemeClr val="accent1"/>
-            </a:fillRef>
-            <a:effectRef idx="0">
-              <a:schemeClr val="accent1"/>
-            </a:effectRef>
-            <a:fontRef idx="minor">
-              <a:schemeClr val="lt1"/>
-            </a:fontRef>
-          </p:style>
-          <p:txBody>
-            <a:bodyPr rtlCol="0" anchor="ctr"/>
-            <a:lstStyle/>
-            <a:p>
-              <a:pPr algn="ctr"/>
-              <a:endParaRPr kumimoji="1" lang="ja-JP" altLang="en-US" dirty="0"/>
-            </a:p>
-          </p:txBody>
-        </p:sp>
-        <p:sp>
-          <p:nvSpPr>
-            <p:cNvPr id="15" name="正方形/長方形 14"/>
-            <p:cNvSpPr/>
-            <p:nvPr/>
-          </p:nvSpPr>
-          <p:spPr>
-            <a:xfrm>
-              <a:off x="6281801" y="3620021"/>
-              <a:ext cx="1089764" cy="1089764"/>
-            </a:xfrm>
-            <a:prstGeom prst="rect">
-              <a:avLst/>
-            </a:prstGeom>
-            <a:solidFill>
-              <a:schemeClr val="tx1"/>
-            </a:solidFill>
-            <a:ln>
-              <a:noFill/>
-            </a:ln>
-          </p:spPr>
-          <p:style>
-            <a:lnRef idx="2">
-              <a:schemeClr val="accent1">
-                <a:shade val="50000"/>
-              </a:schemeClr>
-            </a:lnRef>
-            <a:fillRef idx="1">
-              <a:schemeClr val="accent1"/>
-            </a:fillRef>
-            <a:effectRef idx="0">
-              <a:schemeClr val="accent1"/>
-            </a:effectRef>
-            <a:fontRef idx="minor">
-              <a:schemeClr val="lt1"/>
-            </a:fontRef>
-          </p:style>
-          <p:txBody>
-            <a:bodyPr rtlCol="0" anchor="ctr"/>
-            <a:lstStyle/>
-            <a:p>
-              <a:pPr algn="ctr"/>
-              <a:endParaRPr kumimoji="1" lang="ja-JP" altLang="en-US" dirty="0"/>
-            </a:p>
-          </p:txBody>
-        </p:sp>
-        <p:sp>
-          <p:nvSpPr>
-            <p:cNvPr id="16" name="正方形/長方形 15"/>
-            <p:cNvSpPr/>
-            <p:nvPr/>
-          </p:nvSpPr>
-          <p:spPr>
-            <a:xfrm>
-              <a:off x="7371565" y="350729"/>
-              <a:ext cx="1089764" cy="1089764"/>
-            </a:xfrm>
-            <a:prstGeom prst="rect">
-              <a:avLst/>
-            </a:prstGeom>
-            <a:solidFill>
-              <a:schemeClr val="tx1"/>
-            </a:solidFill>
-            <a:ln>
-              <a:noFill/>
-            </a:ln>
-          </p:spPr>
-          <p:style>
-            <a:lnRef idx="2">
-              <a:schemeClr val="accent1">
-                <a:shade val="50000"/>
-              </a:schemeClr>
-            </a:lnRef>
-            <a:fillRef idx="1">
-              <a:schemeClr val="accent1"/>
-            </a:fillRef>
-            <a:effectRef idx="0">
-              <a:schemeClr val="accent1"/>
-            </a:effectRef>
-            <a:fontRef idx="minor">
-              <a:schemeClr val="lt1"/>
-            </a:fontRef>
-          </p:style>
-          <p:txBody>
-            <a:bodyPr rtlCol="0" anchor="ctr"/>
-            <a:lstStyle/>
-            <a:p>
-              <a:pPr algn="ctr"/>
-              <a:endParaRPr kumimoji="1" lang="ja-JP" altLang="en-US" dirty="0"/>
-            </a:p>
-          </p:txBody>
-        </p:sp>
-        <p:sp>
-          <p:nvSpPr>
-            <p:cNvPr id="17" name="正方形/長方形 16"/>
-            <p:cNvSpPr/>
-            <p:nvPr/>
-          </p:nvSpPr>
-          <p:spPr>
-            <a:xfrm>
-              <a:off x="8461329" y="1440493"/>
-              <a:ext cx="1089764" cy="1089764"/>
-            </a:xfrm>
-            <a:prstGeom prst="rect">
-              <a:avLst/>
-            </a:prstGeom>
-            <a:solidFill>
-              <a:schemeClr val="tx1"/>
-            </a:solidFill>
-            <a:ln>
-              <a:noFill/>
-            </a:ln>
-          </p:spPr>
-          <p:style>
-            <a:lnRef idx="2">
-              <a:schemeClr val="accent1">
-                <a:shade val="50000"/>
-              </a:schemeClr>
-            </a:lnRef>
-            <a:fillRef idx="1">
-              <a:schemeClr val="accent1"/>
-            </a:fillRef>
-            <a:effectRef idx="0">
-              <a:schemeClr val="accent1"/>
-            </a:effectRef>
-            <a:fontRef idx="minor">
-              <a:schemeClr val="lt1"/>
-            </a:fontRef>
-          </p:style>
-          <p:txBody>
-            <a:bodyPr rtlCol="0" anchor="ctr"/>
-            <a:lstStyle/>
-            <a:p>
-              <a:pPr algn="ctr"/>
-              <a:endParaRPr kumimoji="1" lang="ja-JP" altLang="en-US" dirty="0"/>
-            </a:p>
-          </p:txBody>
-        </p:sp>
-        <p:sp>
-          <p:nvSpPr>
-            <p:cNvPr id="18" name="正方形/長方形 17"/>
-            <p:cNvSpPr/>
-            <p:nvPr/>
-          </p:nvSpPr>
-          <p:spPr>
-            <a:xfrm>
-              <a:off x="7371565" y="2530257"/>
-              <a:ext cx="1089764" cy="1089764"/>
-            </a:xfrm>
-            <a:prstGeom prst="rect">
-              <a:avLst/>
-            </a:prstGeom>
-            <a:solidFill>
-              <a:schemeClr val="tx1"/>
-            </a:solidFill>
-            <a:ln>
-              <a:noFill/>
-            </a:ln>
-          </p:spPr>
-          <p:style>
-            <a:lnRef idx="2">
-              <a:schemeClr val="accent1">
-                <a:shade val="50000"/>
-              </a:schemeClr>
-            </a:lnRef>
-            <a:fillRef idx="1">
-              <a:schemeClr val="accent1"/>
-            </a:fillRef>
-            <a:effectRef idx="0">
-              <a:schemeClr val="accent1"/>
-            </a:effectRef>
-            <a:fontRef idx="minor">
-              <a:schemeClr val="lt1"/>
-            </a:fontRef>
-          </p:style>
-          <p:txBody>
-            <a:bodyPr rtlCol="0" anchor="ctr"/>
-            <a:lstStyle/>
-            <a:p>
-              <a:pPr algn="ctr"/>
-              <a:endParaRPr kumimoji="1" lang="ja-JP" altLang="en-US" dirty="0"/>
-            </a:p>
-          </p:txBody>
-        </p:sp>
-        <p:sp>
-          <p:nvSpPr>
-            <p:cNvPr id="19" name="正方形/長方形 18"/>
-            <p:cNvSpPr/>
-            <p:nvPr/>
-          </p:nvSpPr>
-          <p:spPr>
-            <a:xfrm>
-              <a:off x="8461329" y="3620021"/>
-              <a:ext cx="1089764" cy="1089764"/>
-            </a:xfrm>
-            <a:prstGeom prst="rect">
-              <a:avLst/>
-            </a:prstGeom>
-            <a:solidFill>
-              <a:schemeClr val="tx1"/>
-            </a:solidFill>
-            <a:ln>
-              <a:noFill/>
-            </a:ln>
-          </p:spPr>
-          <p:style>
-            <a:lnRef idx="2">
-              <a:schemeClr val="accent1">
-                <a:shade val="50000"/>
-              </a:schemeClr>
-            </a:lnRef>
-            <a:fillRef idx="1">
-              <a:schemeClr val="accent1"/>
-            </a:fillRef>
-            <a:effectRef idx="0">
-              <a:schemeClr val="accent1"/>
-            </a:effectRef>
-            <a:fontRef idx="minor">
-              <a:schemeClr val="lt1"/>
-            </a:fontRef>
-          </p:style>
-          <p:txBody>
-            <a:bodyPr rtlCol="0" anchor="ctr"/>
-            <a:lstStyle/>
-            <a:p>
-              <a:pPr algn="ctr"/>
-              <a:endParaRPr kumimoji="1" lang="ja-JP" altLang="en-US" dirty="0"/>
-            </a:p>
-          </p:txBody>
-        </p:sp>
-        <p:sp>
-          <p:nvSpPr>
-            <p:cNvPr id="20" name="正方形/長方形 19"/>
-            <p:cNvSpPr/>
-            <p:nvPr/>
-          </p:nvSpPr>
-          <p:spPr>
-            <a:xfrm>
-              <a:off x="9551093" y="350729"/>
-              <a:ext cx="1089764" cy="1089764"/>
-            </a:xfrm>
-            <a:prstGeom prst="rect">
-              <a:avLst/>
-            </a:prstGeom>
-            <a:solidFill>
-              <a:schemeClr val="tx1"/>
-            </a:solidFill>
-            <a:ln>
-              <a:noFill/>
-            </a:ln>
-          </p:spPr>
-          <p:style>
-            <a:lnRef idx="2">
-              <a:schemeClr val="accent1">
-                <a:shade val="50000"/>
-              </a:schemeClr>
-            </a:lnRef>
-            <a:fillRef idx="1">
-              <a:schemeClr val="accent1"/>
-            </a:fillRef>
-            <a:effectRef idx="0">
-              <a:schemeClr val="accent1"/>
-            </a:effectRef>
-            <a:fontRef idx="minor">
-              <a:schemeClr val="lt1"/>
-            </a:fontRef>
-          </p:style>
-          <p:txBody>
-            <a:bodyPr rtlCol="0" anchor="ctr"/>
-            <a:lstStyle/>
-            <a:p>
-              <a:pPr algn="ctr"/>
-              <a:endParaRPr lang="ja-JP" altLang="en-US" dirty="0"/>
-            </a:p>
-          </p:txBody>
-        </p:sp>
-        <p:sp>
-          <p:nvSpPr>
-            <p:cNvPr id="21" name="正方形/長方形 20"/>
-            <p:cNvSpPr/>
-            <p:nvPr/>
-          </p:nvSpPr>
-          <p:spPr>
-            <a:xfrm>
-              <a:off x="10640857" y="1440493"/>
-              <a:ext cx="1089764" cy="1089764"/>
-            </a:xfrm>
-            <a:prstGeom prst="rect">
-              <a:avLst/>
-            </a:prstGeom>
-            <a:solidFill>
-              <a:schemeClr val="tx1"/>
-            </a:solidFill>
-            <a:ln>
-              <a:noFill/>
-            </a:ln>
-          </p:spPr>
-          <p:style>
-            <a:lnRef idx="2">
-              <a:schemeClr val="accent1">
-                <a:shade val="50000"/>
-              </a:schemeClr>
-            </a:lnRef>
-            <a:fillRef idx="1">
-              <a:schemeClr val="accent1"/>
-            </a:fillRef>
-            <a:effectRef idx="0">
-              <a:schemeClr val="accent1"/>
-            </a:effectRef>
-            <a:fontRef idx="minor">
-              <a:schemeClr val="lt1"/>
-            </a:fontRef>
-          </p:style>
-          <p:txBody>
-            <a:bodyPr rtlCol="0" anchor="ctr"/>
-            <a:lstStyle/>
-            <a:p>
-              <a:pPr algn="ctr"/>
-              <a:endParaRPr kumimoji="1" lang="ja-JP" altLang="en-US" dirty="0"/>
-            </a:p>
-          </p:txBody>
-        </p:sp>
-        <p:sp>
-          <p:nvSpPr>
-            <p:cNvPr id="22" name="正方形/長方形 21"/>
-            <p:cNvSpPr/>
-            <p:nvPr/>
-          </p:nvSpPr>
-          <p:spPr>
-            <a:xfrm>
-              <a:off x="9551093" y="2530257"/>
-              <a:ext cx="1089764" cy="1089764"/>
-            </a:xfrm>
-            <a:prstGeom prst="rect">
-              <a:avLst/>
-            </a:prstGeom>
-            <a:solidFill>
-              <a:schemeClr val="tx1"/>
-            </a:solidFill>
-            <a:ln>
-              <a:noFill/>
-            </a:ln>
-          </p:spPr>
-          <p:style>
-            <a:lnRef idx="2">
-              <a:schemeClr val="accent1">
-                <a:shade val="50000"/>
-              </a:schemeClr>
-            </a:lnRef>
-            <a:fillRef idx="1">
-              <a:schemeClr val="accent1"/>
-            </a:fillRef>
-            <a:effectRef idx="0">
-              <a:schemeClr val="accent1"/>
-            </a:effectRef>
-            <a:fontRef idx="minor">
-              <a:schemeClr val="lt1"/>
-            </a:fontRef>
-          </p:style>
-          <p:txBody>
-            <a:bodyPr rtlCol="0" anchor="ctr"/>
-            <a:lstStyle/>
-            <a:p>
-              <a:pPr algn="ctr"/>
-              <a:endParaRPr lang="ja-JP" altLang="en-US" dirty="0"/>
-            </a:p>
-          </p:txBody>
-        </p:sp>
-        <p:sp>
-          <p:nvSpPr>
-            <p:cNvPr id="23" name="正方形/長方形 22"/>
-            <p:cNvSpPr/>
-            <p:nvPr/>
-          </p:nvSpPr>
-          <p:spPr>
-            <a:xfrm>
-              <a:off x="10640857" y="3620021"/>
-              <a:ext cx="1089764" cy="1089764"/>
-            </a:xfrm>
-            <a:prstGeom prst="rect">
-              <a:avLst/>
-            </a:prstGeom>
-            <a:solidFill>
-              <a:schemeClr val="tx1"/>
-            </a:solidFill>
-            <a:ln>
-              <a:noFill/>
-            </a:ln>
-          </p:spPr>
-          <p:style>
-            <a:lnRef idx="2">
-              <a:schemeClr val="accent1">
-                <a:shade val="50000"/>
-              </a:schemeClr>
-            </a:lnRef>
-            <a:fillRef idx="1">
-              <a:schemeClr val="accent1"/>
-            </a:fillRef>
-            <a:effectRef idx="0">
-              <a:schemeClr val="accent1"/>
-            </a:effectRef>
-            <a:fontRef idx="minor">
-              <a:schemeClr val="lt1"/>
-            </a:fontRef>
-          </p:style>
-          <p:txBody>
-            <a:bodyPr rtlCol="0" anchor="ctr"/>
-            <a:lstStyle/>
-            <a:p>
-              <a:pPr algn="ctr"/>
-              <a:endParaRPr kumimoji="1" lang="ja-JP" altLang="en-US" dirty="0"/>
-            </a:p>
-          </p:txBody>
-        </p:sp>
-        <p:sp>
-          <p:nvSpPr>
-            <p:cNvPr id="52" name="正方形/長方形 51"/>
-            <p:cNvSpPr/>
-            <p:nvPr/>
-          </p:nvSpPr>
-          <p:spPr>
-            <a:xfrm>
-              <a:off x="11730621" y="350729"/>
-              <a:ext cx="1089764" cy="1089764"/>
-            </a:xfrm>
-            <a:prstGeom prst="rect">
-              <a:avLst/>
-            </a:prstGeom>
-            <a:solidFill>
-              <a:schemeClr val="tx1"/>
-            </a:solidFill>
-            <a:ln>
-              <a:noFill/>
-            </a:ln>
-          </p:spPr>
-          <p:style>
-            <a:lnRef idx="2">
-              <a:schemeClr val="accent1">
-                <a:shade val="50000"/>
-              </a:schemeClr>
-            </a:lnRef>
-            <a:fillRef idx="1">
-              <a:schemeClr val="accent1"/>
-            </a:fillRef>
-            <a:effectRef idx="0">
-              <a:schemeClr val="accent1"/>
-            </a:effectRef>
-            <a:fontRef idx="minor">
-              <a:schemeClr val="lt1"/>
-            </a:fontRef>
-          </p:style>
-          <p:txBody>
-            <a:bodyPr rtlCol="0" anchor="ctr"/>
-            <a:lstStyle/>
-            <a:p>
-              <a:pPr algn="ctr"/>
-              <a:endParaRPr lang="ja-JP" altLang="en-US" dirty="0"/>
-            </a:p>
-          </p:txBody>
-        </p:sp>
-        <p:sp>
-          <p:nvSpPr>
-            <p:cNvPr id="53" name="正方形/長方形 52"/>
-            <p:cNvSpPr/>
-            <p:nvPr/>
-          </p:nvSpPr>
-          <p:spPr>
-            <a:xfrm>
-              <a:off x="11730621" y="2530257"/>
-              <a:ext cx="1089764" cy="1089764"/>
-            </a:xfrm>
-            <a:prstGeom prst="rect">
-              <a:avLst/>
-            </a:prstGeom>
-            <a:solidFill>
-              <a:schemeClr val="tx1"/>
-            </a:solidFill>
-            <a:ln>
-              <a:noFill/>
-            </a:ln>
-          </p:spPr>
-          <p:style>
-            <a:lnRef idx="2">
-              <a:schemeClr val="accent1">
-                <a:shade val="50000"/>
-              </a:schemeClr>
-            </a:lnRef>
-            <a:fillRef idx="1">
-              <a:schemeClr val="accent1"/>
-            </a:fillRef>
-            <a:effectRef idx="0">
-              <a:schemeClr val="accent1"/>
-            </a:effectRef>
-            <a:fontRef idx="minor">
-              <a:schemeClr val="lt1"/>
-            </a:fontRef>
-          </p:style>
-          <p:txBody>
-            <a:bodyPr rtlCol="0" anchor="ctr"/>
-            <a:lstStyle/>
-            <a:p>
-              <a:pPr algn="ctr"/>
-              <a:endParaRPr lang="ja-JP" altLang="en-US" dirty="0"/>
-            </a:p>
-          </p:txBody>
-        </p:sp>
-        <p:sp>
-          <p:nvSpPr>
-            <p:cNvPr id="54" name="正方形/長方形 53"/>
-            <p:cNvSpPr/>
-            <p:nvPr/>
-          </p:nvSpPr>
-          <p:spPr>
-            <a:xfrm>
-              <a:off x="832981" y="4709785"/>
-              <a:ext cx="1089764" cy="1089764"/>
-            </a:xfrm>
-            <a:prstGeom prst="rect">
-              <a:avLst/>
-            </a:prstGeom>
-            <a:solidFill>
-              <a:schemeClr val="tx1"/>
-            </a:solidFill>
-            <a:ln>
-              <a:noFill/>
-            </a:ln>
-          </p:spPr>
-          <p:style>
-            <a:lnRef idx="2">
-              <a:schemeClr val="accent1">
-                <a:shade val="50000"/>
-              </a:schemeClr>
-            </a:lnRef>
-            <a:fillRef idx="1">
-              <a:schemeClr val="accent1"/>
-            </a:fillRef>
-            <a:effectRef idx="0">
-              <a:schemeClr val="accent1"/>
-            </a:effectRef>
-            <a:fontRef idx="minor">
-              <a:schemeClr val="lt1"/>
-            </a:fontRef>
-          </p:style>
-          <p:txBody>
-            <a:bodyPr rtlCol="0" anchor="ctr"/>
-            <a:lstStyle/>
-            <a:p>
-              <a:pPr algn="ctr"/>
-              <a:endParaRPr kumimoji="1" lang="ja-JP" altLang="en-US" dirty="0"/>
-            </a:p>
-          </p:txBody>
-        </p:sp>
-        <p:sp>
-          <p:nvSpPr>
-            <p:cNvPr id="55" name="正方形/長方形 54"/>
-            <p:cNvSpPr/>
-            <p:nvPr/>
-          </p:nvSpPr>
-          <p:spPr>
-            <a:xfrm>
-              <a:off x="1922745" y="5799549"/>
-              <a:ext cx="1089764" cy="1089764"/>
-            </a:xfrm>
-            <a:prstGeom prst="rect">
-              <a:avLst/>
-            </a:prstGeom>
-            <a:solidFill>
-              <a:schemeClr val="tx1"/>
-            </a:solidFill>
-            <a:ln>
-              <a:noFill/>
-            </a:ln>
-          </p:spPr>
-          <p:style>
-            <a:lnRef idx="2">
-              <a:schemeClr val="accent1">
-                <a:shade val="50000"/>
-              </a:schemeClr>
-            </a:lnRef>
-            <a:fillRef idx="1">
-              <a:schemeClr val="accent1"/>
-            </a:fillRef>
-            <a:effectRef idx="0">
-              <a:schemeClr val="accent1"/>
-            </a:effectRef>
-            <a:fontRef idx="minor">
-              <a:schemeClr val="lt1"/>
-            </a:fontRef>
-          </p:style>
-          <p:txBody>
-            <a:bodyPr rtlCol="0" anchor="ctr"/>
-            <a:lstStyle/>
-            <a:p>
-              <a:pPr algn="ctr"/>
-              <a:endParaRPr kumimoji="1" lang="ja-JP" altLang="en-US" dirty="0"/>
-            </a:p>
-          </p:txBody>
-        </p:sp>
-        <p:sp>
-          <p:nvSpPr>
-            <p:cNvPr id="56" name="正方形/長方形 55"/>
-            <p:cNvSpPr/>
-            <p:nvPr/>
-          </p:nvSpPr>
-          <p:spPr>
-            <a:xfrm>
-              <a:off x="3012509" y="4709785"/>
-              <a:ext cx="1089764" cy="1089764"/>
-            </a:xfrm>
-            <a:prstGeom prst="rect">
-              <a:avLst/>
-            </a:prstGeom>
-            <a:solidFill>
-              <a:schemeClr val="tx1"/>
-            </a:solidFill>
-            <a:ln>
-              <a:noFill/>
-            </a:ln>
-          </p:spPr>
-          <p:style>
-            <a:lnRef idx="2">
-              <a:schemeClr val="accent1">
-                <a:shade val="50000"/>
-              </a:schemeClr>
-            </a:lnRef>
-            <a:fillRef idx="1">
-              <a:schemeClr val="accent1"/>
-            </a:fillRef>
-            <a:effectRef idx="0">
-              <a:schemeClr val="accent1"/>
-            </a:effectRef>
-            <a:fontRef idx="minor">
-              <a:schemeClr val="lt1"/>
-            </a:fontRef>
-          </p:style>
-          <p:txBody>
-            <a:bodyPr rtlCol="0" anchor="ctr"/>
-            <a:lstStyle/>
-            <a:p>
-              <a:pPr algn="ctr"/>
-              <a:endParaRPr kumimoji="1" lang="ja-JP" altLang="en-US" dirty="0"/>
-            </a:p>
-          </p:txBody>
-        </p:sp>
-        <p:sp>
-          <p:nvSpPr>
-            <p:cNvPr id="57" name="正方形/長方形 56"/>
-            <p:cNvSpPr/>
-            <p:nvPr/>
-          </p:nvSpPr>
-          <p:spPr>
-            <a:xfrm>
-              <a:off x="4102273" y="5799549"/>
-              <a:ext cx="1089764" cy="1089764"/>
-            </a:xfrm>
-            <a:prstGeom prst="rect">
-              <a:avLst/>
-            </a:prstGeom>
-            <a:solidFill>
-              <a:schemeClr val="tx1"/>
-            </a:solidFill>
-            <a:ln>
-              <a:noFill/>
-            </a:ln>
-          </p:spPr>
-          <p:style>
-            <a:lnRef idx="2">
-              <a:schemeClr val="accent1">
-                <a:shade val="50000"/>
-              </a:schemeClr>
-            </a:lnRef>
-            <a:fillRef idx="1">
-              <a:schemeClr val="accent1"/>
-            </a:fillRef>
-            <a:effectRef idx="0">
-              <a:schemeClr val="accent1"/>
-            </a:effectRef>
-            <a:fontRef idx="minor">
-              <a:schemeClr val="lt1"/>
-            </a:fontRef>
-          </p:style>
-          <p:txBody>
-            <a:bodyPr rtlCol="0" anchor="ctr"/>
-            <a:lstStyle/>
-            <a:p>
-              <a:pPr algn="ctr"/>
-              <a:endParaRPr kumimoji="1" lang="ja-JP" altLang="en-US" dirty="0"/>
-            </a:p>
-          </p:txBody>
-        </p:sp>
-        <p:sp>
-          <p:nvSpPr>
-            <p:cNvPr id="58" name="正方形/長方形 57"/>
-            <p:cNvSpPr/>
-            <p:nvPr/>
-          </p:nvSpPr>
-          <p:spPr>
-            <a:xfrm>
-              <a:off x="5192037" y="4709785"/>
-              <a:ext cx="1089764" cy="1089764"/>
-            </a:xfrm>
-            <a:prstGeom prst="rect">
-              <a:avLst/>
-            </a:prstGeom>
-            <a:solidFill>
-              <a:schemeClr val="tx1"/>
-            </a:solidFill>
-            <a:ln>
-              <a:noFill/>
-            </a:ln>
-          </p:spPr>
-          <p:style>
-            <a:lnRef idx="2">
-              <a:schemeClr val="accent1">
-                <a:shade val="50000"/>
-              </a:schemeClr>
-            </a:lnRef>
-            <a:fillRef idx="1">
-              <a:schemeClr val="accent1"/>
-            </a:fillRef>
-            <a:effectRef idx="0">
-              <a:schemeClr val="accent1"/>
-            </a:effectRef>
-            <a:fontRef idx="minor">
-              <a:schemeClr val="lt1"/>
-            </a:fontRef>
-          </p:style>
-          <p:txBody>
-            <a:bodyPr rtlCol="0" anchor="ctr"/>
-            <a:lstStyle/>
-            <a:p>
-              <a:pPr algn="ctr"/>
-              <a:endParaRPr kumimoji="1" lang="ja-JP" altLang="en-US" dirty="0"/>
-            </a:p>
-          </p:txBody>
-        </p:sp>
-        <p:sp>
-          <p:nvSpPr>
-            <p:cNvPr id="59" name="正方形/長方形 58"/>
-            <p:cNvSpPr/>
-            <p:nvPr/>
-          </p:nvSpPr>
-          <p:spPr>
-            <a:xfrm>
-              <a:off x="6281801" y="5799549"/>
-              <a:ext cx="1089764" cy="1089764"/>
-            </a:xfrm>
-            <a:prstGeom prst="rect">
-              <a:avLst/>
-            </a:prstGeom>
-            <a:solidFill>
-              <a:schemeClr val="tx1"/>
-            </a:solidFill>
-            <a:ln>
-              <a:noFill/>
-            </a:ln>
-          </p:spPr>
-          <p:style>
-            <a:lnRef idx="2">
-              <a:schemeClr val="accent1">
-                <a:shade val="50000"/>
-              </a:schemeClr>
-            </a:lnRef>
-            <a:fillRef idx="1">
-              <a:schemeClr val="accent1"/>
-            </a:fillRef>
-            <a:effectRef idx="0">
-              <a:schemeClr val="accent1"/>
-            </a:effectRef>
-            <a:fontRef idx="minor">
-              <a:schemeClr val="lt1"/>
-            </a:fontRef>
-          </p:style>
-          <p:txBody>
-            <a:bodyPr rtlCol="0" anchor="ctr"/>
-            <a:lstStyle/>
-            <a:p>
-              <a:pPr algn="ctr"/>
-              <a:endParaRPr kumimoji="1" lang="ja-JP" altLang="en-US" dirty="0"/>
-            </a:p>
-          </p:txBody>
-        </p:sp>
-        <p:sp>
-          <p:nvSpPr>
-            <p:cNvPr id="60" name="正方形/長方形 59"/>
-            <p:cNvSpPr/>
-            <p:nvPr/>
-          </p:nvSpPr>
-          <p:spPr>
-            <a:xfrm>
-              <a:off x="7371565" y="4709785"/>
-              <a:ext cx="1089764" cy="1089764"/>
-            </a:xfrm>
-            <a:prstGeom prst="rect">
-              <a:avLst/>
-            </a:prstGeom>
-            <a:solidFill>
-              <a:schemeClr val="tx1"/>
-            </a:solidFill>
-            <a:ln>
-              <a:noFill/>
-            </a:ln>
-          </p:spPr>
-          <p:style>
-            <a:lnRef idx="2">
-              <a:schemeClr val="accent1">
-                <a:shade val="50000"/>
-              </a:schemeClr>
-            </a:lnRef>
-            <a:fillRef idx="1">
-              <a:schemeClr val="accent1"/>
-            </a:fillRef>
-            <a:effectRef idx="0">
-              <a:schemeClr val="accent1"/>
-            </a:effectRef>
-            <a:fontRef idx="minor">
-              <a:schemeClr val="lt1"/>
-            </a:fontRef>
-          </p:style>
-          <p:txBody>
-            <a:bodyPr rtlCol="0" anchor="ctr"/>
-            <a:lstStyle/>
-            <a:p>
-              <a:pPr algn="ctr"/>
-              <a:endParaRPr kumimoji="1" lang="ja-JP" altLang="en-US" dirty="0"/>
-            </a:p>
-          </p:txBody>
-        </p:sp>
-        <p:sp>
-          <p:nvSpPr>
-            <p:cNvPr id="61" name="正方形/長方形 60"/>
-            <p:cNvSpPr/>
-            <p:nvPr/>
-          </p:nvSpPr>
-          <p:spPr>
-            <a:xfrm>
-              <a:off x="8461329" y="5799549"/>
-              <a:ext cx="1089764" cy="1089764"/>
-            </a:xfrm>
-            <a:prstGeom prst="rect">
-              <a:avLst/>
-            </a:prstGeom>
-            <a:solidFill>
-              <a:schemeClr val="tx1"/>
-            </a:solidFill>
-            <a:ln>
-              <a:noFill/>
-            </a:ln>
-          </p:spPr>
-          <p:style>
-            <a:lnRef idx="2">
-              <a:schemeClr val="accent1">
-                <a:shade val="50000"/>
-              </a:schemeClr>
-            </a:lnRef>
-            <a:fillRef idx="1">
-              <a:schemeClr val="accent1"/>
-            </a:fillRef>
-            <a:effectRef idx="0">
-              <a:schemeClr val="accent1"/>
-            </a:effectRef>
-            <a:fontRef idx="minor">
-              <a:schemeClr val="lt1"/>
-            </a:fontRef>
-          </p:style>
-          <p:txBody>
-            <a:bodyPr rtlCol="0" anchor="ctr"/>
-            <a:lstStyle/>
-            <a:p>
-              <a:pPr algn="ctr"/>
-              <a:endParaRPr kumimoji="1" lang="ja-JP" altLang="en-US" dirty="0"/>
-            </a:p>
-          </p:txBody>
-        </p:sp>
-        <p:sp>
-          <p:nvSpPr>
-            <p:cNvPr id="62" name="正方形/長方形 61"/>
-            <p:cNvSpPr/>
-            <p:nvPr/>
-          </p:nvSpPr>
-          <p:spPr>
-            <a:xfrm>
-              <a:off x="9551093" y="4709785"/>
-              <a:ext cx="1089764" cy="1089764"/>
-            </a:xfrm>
-            <a:prstGeom prst="rect">
-              <a:avLst/>
-            </a:prstGeom>
-            <a:solidFill>
-              <a:schemeClr val="tx1"/>
-            </a:solidFill>
-            <a:ln>
-              <a:noFill/>
-            </a:ln>
-          </p:spPr>
-          <p:style>
-            <a:lnRef idx="2">
-              <a:schemeClr val="accent1">
-                <a:shade val="50000"/>
-              </a:schemeClr>
-            </a:lnRef>
-            <a:fillRef idx="1">
-              <a:schemeClr val="accent1"/>
-            </a:fillRef>
-            <a:effectRef idx="0">
-              <a:schemeClr val="accent1"/>
-            </a:effectRef>
-            <a:fontRef idx="minor">
-              <a:schemeClr val="lt1"/>
-            </a:fontRef>
-          </p:style>
-          <p:txBody>
-            <a:bodyPr rtlCol="0" anchor="ctr"/>
-            <a:lstStyle/>
-            <a:p>
-              <a:pPr algn="ctr"/>
-              <a:endParaRPr lang="ja-JP" altLang="en-US" dirty="0"/>
-            </a:p>
-          </p:txBody>
-        </p:sp>
-        <p:sp>
-          <p:nvSpPr>
-            <p:cNvPr id="63" name="正方形/長方形 62"/>
-            <p:cNvSpPr/>
-            <p:nvPr/>
-          </p:nvSpPr>
-          <p:spPr>
-            <a:xfrm>
-              <a:off x="10640857" y="5799549"/>
-              <a:ext cx="1089764" cy="1089764"/>
-            </a:xfrm>
-            <a:prstGeom prst="rect">
-              <a:avLst/>
-            </a:prstGeom>
-            <a:solidFill>
-              <a:schemeClr val="tx1"/>
-            </a:solidFill>
-            <a:ln>
-              <a:noFill/>
-            </a:ln>
-          </p:spPr>
-          <p:style>
-            <a:lnRef idx="2">
-              <a:schemeClr val="accent1">
-                <a:shade val="50000"/>
-              </a:schemeClr>
-            </a:lnRef>
-            <a:fillRef idx="1">
-              <a:schemeClr val="accent1"/>
-            </a:fillRef>
-            <a:effectRef idx="0">
-              <a:schemeClr val="accent1"/>
-            </a:effectRef>
-            <a:fontRef idx="minor">
-              <a:schemeClr val="lt1"/>
-            </a:fontRef>
-          </p:style>
-          <p:txBody>
-            <a:bodyPr rtlCol="0" anchor="ctr"/>
-            <a:lstStyle/>
-            <a:p>
-              <a:pPr algn="ctr"/>
-              <a:endParaRPr kumimoji="1" lang="ja-JP" altLang="en-US" dirty="0"/>
-            </a:p>
-          </p:txBody>
-        </p:sp>
-        <p:sp>
-          <p:nvSpPr>
-            <p:cNvPr id="64" name="正方形/長方形 63"/>
-            <p:cNvSpPr/>
-            <p:nvPr/>
-          </p:nvSpPr>
-          <p:spPr>
-            <a:xfrm>
-              <a:off x="11730621" y="4709785"/>
-              <a:ext cx="1089764" cy="1089764"/>
-            </a:xfrm>
-            <a:prstGeom prst="rect">
-              <a:avLst/>
-            </a:prstGeom>
-            <a:solidFill>
-              <a:schemeClr val="tx1"/>
-            </a:solidFill>
-            <a:ln>
-              <a:noFill/>
-            </a:ln>
-          </p:spPr>
-          <p:style>
-            <a:lnRef idx="2">
-              <a:schemeClr val="accent1">
-                <a:shade val="50000"/>
-              </a:schemeClr>
-            </a:lnRef>
-            <a:fillRef idx="1">
-              <a:schemeClr val="accent1"/>
-            </a:fillRef>
-            <a:effectRef idx="0">
-              <a:schemeClr val="accent1"/>
-            </a:effectRef>
-            <a:fontRef idx="minor">
-              <a:schemeClr val="lt1"/>
-            </a:fontRef>
-          </p:style>
-          <p:txBody>
-            <a:bodyPr rtlCol="0" anchor="ctr"/>
-            <a:lstStyle/>
-            <a:p>
-              <a:pPr algn="ctr"/>
-              <a:endParaRPr lang="ja-JP" altLang="en-US" dirty="0"/>
-            </a:p>
-          </p:txBody>
-        </p:sp>
-        <p:sp>
-          <p:nvSpPr>
-            <p:cNvPr id="65" name="正方形/長方形 64"/>
-            <p:cNvSpPr/>
-            <p:nvPr/>
-          </p:nvSpPr>
-          <p:spPr>
-            <a:xfrm>
-              <a:off x="832981" y="6858000"/>
-              <a:ext cx="1089764" cy="1089764"/>
-            </a:xfrm>
-            <a:prstGeom prst="rect">
-              <a:avLst/>
-            </a:prstGeom>
-            <a:solidFill>
-              <a:schemeClr val="tx1"/>
-            </a:solidFill>
-            <a:ln>
-              <a:noFill/>
-            </a:ln>
-          </p:spPr>
-          <p:style>
-            <a:lnRef idx="2">
-              <a:schemeClr val="accent1">
-                <a:shade val="50000"/>
-              </a:schemeClr>
-            </a:lnRef>
-            <a:fillRef idx="1">
-              <a:schemeClr val="accent1"/>
-            </a:fillRef>
-            <a:effectRef idx="0">
-              <a:schemeClr val="accent1"/>
-            </a:effectRef>
-            <a:fontRef idx="minor">
-              <a:schemeClr val="lt1"/>
-            </a:fontRef>
-          </p:style>
-          <p:txBody>
-            <a:bodyPr rtlCol="0" anchor="ctr"/>
-            <a:lstStyle/>
-            <a:p>
-              <a:pPr algn="ctr"/>
-              <a:endParaRPr kumimoji="1" lang="ja-JP" altLang="en-US" dirty="0"/>
-            </a:p>
-          </p:txBody>
-        </p:sp>
-        <p:sp>
-          <p:nvSpPr>
-            <p:cNvPr id="66" name="正方形/長方形 65"/>
-            <p:cNvSpPr/>
-            <p:nvPr/>
-          </p:nvSpPr>
-          <p:spPr>
-            <a:xfrm>
-              <a:off x="1922745" y="7947764"/>
-              <a:ext cx="1089764" cy="1089764"/>
-            </a:xfrm>
-            <a:prstGeom prst="rect">
-              <a:avLst/>
-            </a:prstGeom>
-            <a:solidFill>
-              <a:schemeClr val="tx1"/>
-            </a:solidFill>
-            <a:ln>
-              <a:noFill/>
-            </a:ln>
-          </p:spPr>
-          <p:style>
-            <a:lnRef idx="2">
-              <a:schemeClr val="accent1">
-                <a:shade val="50000"/>
-              </a:schemeClr>
-            </a:lnRef>
-            <a:fillRef idx="1">
-              <a:schemeClr val="accent1"/>
-            </a:fillRef>
-            <a:effectRef idx="0">
-              <a:schemeClr val="accent1"/>
-            </a:effectRef>
-            <a:fontRef idx="minor">
-              <a:schemeClr val="lt1"/>
-            </a:fontRef>
-          </p:style>
-          <p:txBody>
-            <a:bodyPr rtlCol="0" anchor="ctr"/>
-            <a:lstStyle/>
-            <a:p>
-              <a:pPr algn="ctr"/>
-              <a:endParaRPr kumimoji="1" lang="ja-JP" altLang="en-US" dirty="0"/>
-            </a:p>
-          </p:txBody>
-        </p:sp>
-        <p:sp>
-          <p:nvSpPr>
-            <p:cNvPr id="67" name="正方形/長方形 66"/>
-            <p:cNvSpPr/>
-            <p:nvPr/>
-          </p:nvSpPr>
-          <p:spPr>
-            <a:xfrm>
-              <a:off x="3012509" y="6858000"/>
-              <a:ext cx="1089764" cy="1089764"/>
-            </a:xfrm>
-            <a:prstGeom prst="rect">
-              <a:avLst/>
-            </a:prstGeom>
-            <a:solidFill>
-              <a:schemeClr val="tx1"/>
-            </a:solidFill>
-            <a:ln>
-              <a:noFill/>
-            </a:ln>
-          </p:spPr>
-          <p:style>
-            <a:lnRef idx="2">
-              <a:schemeClr val="accent1">
-                <a:shade val="50000"/>
-              </a:schemeClr>
-            </a:lnRef>
-            <a:fillRef idx="1">
-              <a:schemeClr val="accent1"/>
-            </a:fillRef>
-            <a:effectRef idx="0">
-              <a:schemeClr val="accent1"/>
-            </a:effectRef>
-            <a:fontRef idx="minor">
-              <a:schemeClr val="lt1"/>
-            </a:fontRef>
-          </p:style>
-          <p:txBody>
-            <a:bodyPr rtlCol="0" anchor="ctr"/>
-            <a:lstStyle/>
-            <a:p>
-              <a:pPr algn="ctr"/>
-              <a:endParaRPr kumimoji="1" lang="ja-JP" altLang="en-US" dirty="0"/>
-            </a:p>
-          </p:txBody>
-        </p:sp>
-        <p:sp>
-          <p:nvSpPr>
-            <p:cNvPr id="68" name="正方形/長方形 67"/>
-            <p:cNvSpPr/>
-            <p:nvPr/>
-          </p:nvSpPr>
-          <p:spPr>
-            <a:xfrm>
-              <a:off x="4102273" y="7947764"/>
-              <a:ext cx="1089764" cy="1089764"/>
-            </a:xfrm>
-            <a:prstGeom prst="rect">
-              <a:avLst/>
-            </a:prstGeom>
-            <a:solidFill>
-              <a:schemeClr val="tx1"/>
-            </a:solidFill>
-            <a:ln>
-              <a:noFill/>
-            </a:ln>
-          </p:spPr>
-          <p:style>
-            <a:lnRef idx="2">
-              <a:schemeClr val="accent1">
-                <a:shade val="50000"/>
-              </a:schemeClr>
-            </a:lnRef>
-            <a:fillRef idx="1">
-              <a:schemeClr val="accent1"/>
-            </a:fillRef>
-            <a:effectRef idx="0">
-              <a:schemeClr val="accent1"/>
-            </a:effectRef>
-            <a:fontRef idx="minor">
-              <a:schemeClr val="lt1"/>
-            </a:fontRef>
-          </p:style>
-          <p:txBody>
-            <a:bodyPr rtlCol="0" anchor="ctr"/>
-            <a:lstStyle/>
-            <a:p>
-              <a:pPr algn="ctr"/>
-              <a:endParaRPr kumimoji="1" lang="ja-JP" altLang="en-US" dirty="0"/>
-            </a:p>
-          </p:txBody>
-        </p:sp>
-        <p:sp>
-          <p:nvSpPr>
-            <p:cNvPr id="69" name="正方形/長方形 68"/>
-            <p:cNvSpPr/>
-            <p:nvPr/>
-          </p:nvSpPr>
-          <p:spPr>
-            <a:xfrm>
-              <a:off x="5192037" y="6858000"/>
-              <a:ext cx="1089764" cy="1089764"/>
-            </a:xfrm>
-            <a:prstGeom prst="rect">
-              <a:avLst/>
-            </a:prstGeom>
-            <a:solidFill>
-              <a:schemeClr val="tx1"/>
-            </a:solidFill>
-            <a:ln>
-              <a:noFill/>
-            </a:ln>
-          </p:spPr>
-          <p:style>
-            <a:lnRef idx="2">
-              <a:schemeClr val="accent1">
-                <a:shade val="50000"/>
-              </a:schemeClr>
-            </a:lnRef>
-            <a:fillRef idx="1">
-              <a:schemeClr val="accent1"/>
-            </a:fillRef>
-            <a:effectRef idx="0">
-              <a:schemeClr val="accent1"/>
-            </a:effectRef>
-            <a:fontRef idx="minor">
-              <a:schemeClr val="lt1"/>
-            </a:fontRef>
-          </p:style>
-          <p:txBody>
-            <a:bodyPr rtlCol="0" anchor="ctr"/>
-            <a:lstStyle/>
-            <a:p>
-              <a:pPr algn="ctr"/>
-              <a:endParaRPr kumimoji="1" lang="ja-JP" altLang="en-US" dirty="0"/>
-            </a:p>
-          </p:txBody>
-        </p:sp>
-        <p:sp>
-          <p:nvSpPr>
-            <p:cNvPr id="70" name="正方形/長方形 69"/>
-            <p:cNvSpPr/>
-            <p:nvPr/>
-          </p:nvSpPr>
-          <p:spPr>
-            <a:xfrm>
-              <a:off x="6281801" y="7947764"/>
-              <a:ext cx="1089764" cy="1089764"/>
-            </a:xfrm>
-            <a:prstGeom prst="rect">
-              <a:avLst/>
-            </a:prstGeom>
-            <a:solidFill>
-              <a:schemeClr val="tx1"/>
-            </a:solidFill>
-            <a:ln>
-              <a:noFill/>
-            </a:ln>
-          </p:spPr>
-          <p:style>
-            <a:lnRef idx="2">
-              <a:schemeClr val="accent1">
-                <a:shade val="50000"/>
-              </a:schemeClr>
-            </a:lnRef>
-            <a:fillRef idx="1">
-              <a:schemeClr val="accent1"/>
-            </a:fillRef>
-            <a:effectRef idx="0">
-              <a:schemeClr val="accent1"/>
-            </a:effectRef>
-            <a:fontRef idx="minor">
-              <a:schemeClr val="lt1"/>
-            </a:fontRef>
-          </p:style>
-          <p:txBody>
-            <a:bodyPr rtlCol="0" anchor="ctr"/>
-            <a:lstStyle/>
-            <a:p>
-              <a:pPr algn="ctr"/>
-              <a:endParaRPr kumimoji="1" lang="ja-JP" altLang="en-US" dirty="0"/>
-            </a:p>
-          </p:txBody>
-        </p:sp>
-        <p:sp>
-          <p:nvSpPr>
-            <p:cNvPr id="71" name="正方形/長方形 70"/>
-            <p:cNvSpPr/>
-            <p:nvPr/>
-          </p:nvSpPr>
-          <p:spPr>
-            <a:xfrm>
-              <a:off x="7371565" y="6858000"/>
-              <a:ext cx="1089764" cy="1089764"/>
-            </a:xfrm>
-            <a:prstGeom prst="rect">
-              <a:avLst/>
-            </a:prstGeom>
-            <a:solidFill>
-              <a:schemeClr val="tx1"/>
-            </a:solidFill>
-            <a:ln>
-              <a:noFill/>
-            </a:ln>
-          </p:spPr>
-          <p:style>
-            <a:lnRef idx="2">
-              <a:schemeClr val="accent1">
-                <a:shade val="50000"/>
-              </a:schemeClr>
-            </a:lnRef>
-            <a:fillRef idx="1">
-              <a:schemeClr val="accent1"/>
-            </a:fillRef>
-            <a:effectRef idx="0">
-              <a:schemeClr val="accent1"/>
-            </a:effectRef>
-            <a:fontRef idx="minor">
-              <a:schemeClr val="lt1"/>
-            </a:fontRef>
-          </p:style>
-          <p:txBody>
-            <a:bodyPr rtlCol="0" anchor="ctr"/>
-            <a:lstStyle/>
-            <a:p>
-              <a:pPr algn="ctr"/>
-              <a:endParaRPr kumimoji="1" lang="ja-JP" altLang="en-US" dirty="0"/>
-            </a:p>
-          </p:txBody>
-        </p:sp>
-        <p:sp>
-          <p:nvSpPr>
-            <p:cNvPr id="72" name="正方形/長方形 71"/>
-            <p:cNvSpPr/>
-            <p:nvPr/>
-          </p:nvSpPr>
-          <p:spPr>
-            <a:xfrm>
-              <a:off x="8461329" y="7947764"/>
-              <a:ext cx="1089764" cy="1089764"/>
-            </a:xfrm>
-            <a:prstGeom prst="rect">
-              <a:avLst/>
-            </a:prstGeom>
-            <a:solidFill>
-              <a:schemeClr val="tx1"/>
-            </a:solidFill>
-            <a:ln>
-              <a:noFill/>
-            </a:ln>
-          </p:spPr>
-          <p:style>
-            <a:lnRef idx="2">
-              <a:schemeClr val="accent1">
-                <a:shade val="50000"/>
-              </a:schemeClr>
-            </a:lnRef>
-            <a:fillRef idx="1">
-              <a:schemeClr val="accent1"/>
-            </a:fillRef>
-            <a:effectRef idx="0">
-              <a:schemeClr val="accent1"/>
-            </a:effectRef>
-            <a:fontRef idx="minor">
-              <a:schemeClr val="lt1"/>
-            </a:fontRef>
-          </p:style>
-          <p:txBody>
-            <a:bodyPr rtlCol="0" anchor="ctr"/>
-            <a:lstStyle/>
-            <a:p>
-              <a:pPr algn="ctr"/>
-              <a:endParaRPr kumimoji="1" lang="ja-JP" altLang="en-US" dirty="0"/>
-            </a:p>
-          </p:txBody>
-        </p:sp>
-        <p:sp>
-          <p:nvSpPr>
-            <p:cNvPr id="73" name="正方形/長方形 72"/>
-            <p:cNvSpPr/>
-            <p:nvPr/>
-          </p:nvSpPr>
-          <p:spPr>
-            <a:xfrm>
-              <a:off x="9551093" y="6858000"/>
-              <a:ext cx="1089764" cy="1089764"/>
-            </a:xfrm>
-            <a:prstGeom prst="rect">
-              <a:avLst/>
-            </a:prstGeom>
-            <a:solidFill>
-              <a:schemeClr val="tx1"/>
-            </a:solidFill>
-            <a:ln>
-              <a:noFill/>
-            </a:ln>
-          </p:spPr>
-          <p:style>
-            <a:lnRef idx="2">
-              <a:schemeClr val="accent1">
-                <a:shade val="50000"/>
-              </a:schemeClr>
-            </a:lnRef>
-            <a:fillRef idx="1">
-              <a:schemeClr val="accent1"/>
-            </a:fillRef>
-            <a:effectRef idx="0">
-              <a:schemeClr val="accent1"/>
-            </a:effectRef>
-            <a:fontRef idx="minor">
-              <a:schemeClr val="lt1"/>
-            </a:fontRef>
-          </p:style>
-          <p:txBody>
-            <a:bodyPr rtlCol="0" anchor="ctr"/>
-            <a:lstStyle/>
-            <a:p>
-              <a:pPr algn="ctr"/>
-              <a:endParaRPr lang="ja-JP" altLang="en-US" dirty="0"/>
-            </a:p>
-          </p:txBody>
-        </p:sp>
-        <p:sp>
-          <p:nvSpPr>
-            <p:cNvPr id="74" name="正方形/長方形 73"/>
-            <p:cNvSpPr/>
-            <p:nvPr/>
-          </p:nvSpPr>
-          <p:spPr>
-            <a:xfrm>
-              <a:off x="10640857" y="7947764"/>
-              <a:ext cx="1089764" cy="1089764"/>
-            </a:xfrm>
-            <a:prstGeom prst="rect">
-              <a:avLst/>
-            </a:prstGeom>
-            <a:solidFill>
-              <a:schemeClr val="tx1"/>
-            </a:solidFill>
-            <a:ln>
-              <a:noFill/>
-            </a:ln>
-          </p:spPr>
-          <p:style>
-            <a:lnRef idx="2">
-              <a:schemeClr val="accent1">
-                <a:shade val="50000"/>
-              </a:schemeClr>
-            </a:lnRef>
-            <a:fillRef idx="1">
-              <a:schemeClr val="accent1"/>
-            </a:fillRef>
-            <a:effectRef idx="0">
-              <a:schemeClr val="accent1"/>
-            </a:effectRef>
-            <a:fontRef idx="minor">
-              <a:schemeClr val="lt1"/>
-            </a:fontRef>
-          </p:style>
-          <p:txBody>
-            <a:bodyPr rtlCol="0" anchor="ctr"/>
-            <a:lstStyle/>
-            <a:p>
-              <a:pPr algn="ctr"/>
-              <a:endParaRPr kumimoji="1" lang="ja-JP" altLang="en-US" dirty="0"/>
-            </a:p>
-          </p:txBody>
-        </p:sp>
-        <p:sp>
-          <p:nvSpPr>
-            <p:cNvPr id="75" name="正方形/長方形 74"/>
-            <p:cNvSpPr/>
-            <p:nvPr/>
-          </p:nvSpPr>
-          <p:spPr>
-            <a:xfrm>
-              <a:off x="11730621" y="6858000"/>
-              <a:ext cx="1089764" cy="1089764"/>
-            </a:xfrm>
-            <a:prstGeom prst="rect">
-              <a:avLst/>
-            </a:prstGeom>
-            <a:solidFill>
-              <a:schemeClr val="tx1"/>
-            </a:solidFill>
-            <a:ln>
-              <a:noFill/>
-            </a:ln>
-          </p:spPr>
-          <p:style>
-            <a:lnRef idx="2">
-              <a:schemeClr val="accent1">
-                <a:shade val="50000"/>
-              </a:schemeClr>
-            </a:lnRef>
-            <a:fillRef idx="1">
-              <a:schemeClr val="accent1"/>
-            </a:fillRef>
-            <a:effectRef idx="0">
-              <a:schemeClr val="accent1"/>
-            </a:effectRef>
-            <a:fontRef idx="minor">
-              <a:schemeClr val="lt1"/>
-            </a:fontRef>
-          </p:style>
-          <p:txBody>
-            <a:bodyPr rtlCol="0" anchor="ctr"/>
-            <a:lstStyle/>
-            <a:p>
-              <a:pPr algn="ctr"/>
-              <a:endParaRPr lang="ja-JP" altLang="en-US" dirty="0"/>
-            </a:p>
-          </p:txBody>
-        </p:sp>
-      </p:grpSp>
-      <p:sp>
-        <p:nvSpPr>
-          <p:cNvPr id="77" name="正方形/長方形 76"/>
+          <a:prstGeom prst="rect">
+            <a:avLst/>
+          </a:prstGeom>
+        </p:spPr>
+      </p:pic>
+      <p:sp>
+        <p:nvSpPr>
+          <p:cNvPr id="6" name="正方形/長方形 5"/>
           <p:cNvSpPr/>
           <p:nvPr/>
         </p:nvSpPr>
@@ -5337,7 +3327,7 @@
     </p:spTree>
     <p:extLst>
       <p:ext uri="{BB962C8B-B14F-4D97-AF65-F5344CB8AC3E}">
-        <p14:creationId xmlns:p14="http://schemas.microsoft.com/office/powerpoint/2010/main" val="3656140770"/>
+        <p14:creationId xmlns:p14="http://schemas.microsoft.com/office/powerpoint/2010/main" val="1472076868"/>
       </p:ext>
     </p:extLst>
   </p:cSld>

</xml_diff>